<commit_message>
Adding github repo and thank you slide
</commit_message>
<xml_diff>
--- a/Git_Best_Practices.pptx
+++ b/Git_Best_Practices.pptx
@@ -5,7 +5,7 @@
     <p:sldMasterId id="2147483660" r:id="rId1"/>
   </p:sldMasterIdLst>
   <p:notesMasterIdLst>
-    <p:notesMasterId r:id="rId13"/>
+    <p:notesMasterId r:id="rId14"/>
   </p:notesMasterIdLst>
   <p:sldIdLst>
     <p:sldId id="256" r:id="rId2"/>
@@ -19,26 +19,27 @@
     <p:sldId id="292" r:id="rId10"/>
     <p:sldId id="294" r:id="rId11"/>
     <p:sldId id="298" r:id="rId12"/>
+    <p:sldId id="299" r:id="rId13"/>
   </p:sldIdLst>
   <p:sldSz cx="9144000" cy="6858000" type="screen4x3"/>
   <p:notesSz cx="6934200" cy="9232900"/>
   <p:embeddedFontLst>
     <p:embeddedFont>
-      <p:font typeface="Merriweather" panose="020B0604020202020204" charset="0"/>
-      <p:regular r:id="rId14"/>
-      <p:bold r:id="rId15"/>
-      <p:italic r:id="rId16"/>
-      <p:boldItalic r:id="rId17"/>
-    </p:embeddedFont>
-    <p:embeddedFont>
       <p:font typeface="Amatic SC" panose="020B0604020202020204" charset="-79"/>
-      <p:regular r:id="rId18"/>
-      <p:bold r:id="rId19"/>
+      <p:regular r:id="rId15"/>
+      <p:bold r:id="rId16"/>
     </p:embeddedFont>
     <p:embeddedFont>
       <p:font typeface="Source Code Pro" panose="020B0604020202020204" charset="0"/>
-      <p:regular r:id="rId20"/>
-      <p:bold r:id="rId21"/>
+      <p:regular r:id="rId17"/>
+      <p:bold r:id="rId18"/>
+    </p:embeddedFont>
+    <p:embeddedFont>
+      <p:font typeface="Merriweather" panose="020B0604020202020204" charset="0"/>
+      <p:regular r:id="rId19"/>
+      <p:bold r:id="rId20"/>
+      <p:italic r:id="rId21"/>
+      <p:boldItalic r:id="rId22"/>
     </p:embeddedFont>
   </p:embeddedFontLst>
   <p:defaultTextStyle>
@@ -2913,7 +2914,7 @@
           <a:p>
             <a:fld id="{559FE8C8-AC97-4ADA-A254-8F11A723A69F}" type="datetimeFigureOut">
               <a:rPr lang="en-US" smtClean="0"/>
-              <a:t>6/25/2019</a:t>
+              <a:t>6/27/2019</a:t>
             </a:fld>
             <a:endParaRPr lang="en-US"/>
           </a:p>
@@ -3334,7 +3335,7 @@
           <a:p>
             <a:fld id="{B88F23AA-34D9-4A18-A5A1-06793324E42C}" type="datetimeFigureOut">
               <a:rPr lang="en-US" smtClean="0"/>
-              <a:t>6/25/2019</a:t>
+              <a:t>6/27/2019</a:t>
             </a:fld>
             <a:endParaRPr lang="en-US"/>
           </a:p>
@@ -3456,7 +3457,7 @@
           <a:p>
             <a:fld id="{8DA20C1D-75ED-450C-88C7-C497EA874E9C}" type="datetimeFigureOut">
               <a:rPr lang="en-US" smtClean="0"/>
-              <a:t>6/25/2019</a:t>
+              <a:t>6/27/2019</a:t>
             </a:fld>
             <a:endParaRPr lang="en-US"/>
           </a:p>
@@ -4650,7 +4651,7 @@
           <a:p>
             <a:fld id="{FEFA0557-7C35-4D1D-B97A-95898D157B33}" type="datetimeFigureOut">
               <a:rPr lang="en-US" smtClean="0"/>
-              <a:t>6/25/2019</a:t>
+              <a:t>6/27/2019</a:t>
             </a:fld>
             <a:endParaRPr lang="en-US"/>
           </a:p>
@@ -4936,7 +4937,7 @@
           <a:p>
             <a:fld id="{B236AB90-F632-4852-BC4B-53E103869F3D}" type="datetimeFigureOut">
               <a:rPr lang="en-US" smtClean="0"/>
-              <a:t>6/25/2019</a:t>
+              <a:t>6/27/2019</a:t>
             </a:fld>
             <a:endParaRPr lang="en-US"/>
           </a:p>
@@ -5322,7 +5323,7 @@
           <a:p>
             <a:fld id="{12374C44-A702-4728-BB40-76FE555B9CF1}" type="datetimeFigureOut">
               <a:rPr lang="en-US" smtClean="0"/>
-              <a:t>6/25/2019</a:t>
+              <a:t>6/27/2019</a:t>
             </a:fld>
             <a:endParaRPr lang="en-US"/>
           </a:p>
@@ -5535,7 +5536,7 @@
           <a:p>
             <a:fld id="{E1F32DF0-702E-431A-ADCF-2A06AC4E7F57}" type="datetimeFigureOut">
               <a:rPr lang="en-US" smtClean="0"/>
-              <a:t>6/25/2019</a:t>
+              <a:t>6/27/2019</a:t>
             </a:fld>
             <a:endParaRPr lang="en-US"/>
           </a:p>
@@ -5839,7 +5840,7 @@
           <a:p>
             <a:fld id="{DBDC1F8B-7509-4E85-ABDB-3F1EEA772746}" type="datetimeFigureOut">
               <a:rPr lang="en-US" smtClean="0"/>
-              <a:t>6/25/2019</a:t>
+              <a:t>6/27/2019</a:t>
             </a:fld>
             <a:endParaRPr lang="en-US"/>
           </a:p>
@@ -6131,7 +6132,7 @@
           <a:p>
             <a:fld id="{52C5D9E0-CA9E-46E5-9606-B0D66E683FEE}" type="datetimeFigureOut">
               <a:rPr lang="en-US" smtClean="0"/>
-              <a:t>6/25/2019</a:t>
+              <a:t>6/27/2019</a:t>
             </a:fld>
             <a:endParaRPr lang="en-US"/>
           </a:p>
@@ -6705,7 +6706,7 @@
           <a:p>
             <a:fld id="{5BA37E64-D101-4693-B362-74BB0158B47B}" type="datetimeFigureOut">
               <a:rPr lang="en-US" smtClean="0"/>
-              <a:t>6/25/2019</a:t>
+              <a:t>6/27/2019</a:t>
             </a:fld>
             <a:endParaRPr lang="en-US"/>
           </a:p>
@@ -6881,7 +6882,7 @@
           <a:p>
             <a:fld id="{FACA2033-B529-4F88-BF0F-C9E77C7AF715}" type="datetimeFigureOut">
               <a:rPr lang="en-US" smtClean="0"/>
-              <a:t>6/25/2019</a:t>
+              <a:t>6/27/2019</a:t>
             </a:fld>
             <a:endParaRPr lang="en-US"/>
           </a:p>
@@ -7521,7 +7522,7 @@
           <a:p>
             <a:fld id="{2F850279-8577-4DB5-A1B1-2A1239DFFE30}" type="datetimeFigureOut">
               <a:rPr lang="en-US" smtClean="0"/>
-              <a:t>6/25/2019</a:t>
+              <a:t>6/27/2019</a:t>
             </a:fld>
             <a:endParaRPr lang="en-US"/>
           </a:p>
@@ -8706,8 +8707,8 @@
         </p:nvSpPr>
         <p:spPr>
           <a:xfrm>
-            <a:off x="292100" y="533400"/>
-            <a:ext cx="8229600" cy="1371600"/>
+            <a:off x="261013" y="152400"/>
+            <a:ext cx="8229600" cy="838200"/>
           </a:xfrm>
           <a:prstGeom prst="rect">
             <a:avLst/>
@@ -8723,22 +8724,11 @@
           </a:bodyPr>
           <a:lstStyle/>
           <a:p>
-            <a:pPr marL="0" marR="0" lvl="0" indent="0" algn="ctr" rtl="0">
-              <a:lnSpc>
-                <a:spcPct val="100000"/>
-              </a:lnSpc>
-              <a:spcBef>
-                <a:spcPts val="0"/>
-              </a:spcBef>
-              <a:spcAft>
-                <a:spcPts val="0"/>
-              </a:spcAft>
+            <a:pPr lvl="0" algn="ctr">
               <a:buClr>
                 <a:schemeClr val="dk2"/>
               </a:buClr>
               <a:buSzPct val="25000"/>
-              <a:buFont typeface="Arial"/>
-              <a:buNone/>
             </a:pPr>
             <a:r>
               <a:rPr lang="en-US" sz="4400" b="0" i="0" u="none" strike="noStrike" cap="none" dirty="0" smtClean="0">
@@ -8750,7 +8740,7 @@
                 <a:cs typeface="Arial"/>
                 <a:sym typeface="Arial"/>
               </a:rPr>
-              <a:t>Question?</a:t>
+              <a:t>Questions?</a:t>
             </a:r>
             <a:r>
               <a:rPr lang="en-US" sz="4400" dirty="0" smtClean="0"/>
@@ -8768,37 +8758,51 @@
             </a:br>
             <a:r>
               <a:rPr lang="en-US" sz="4400" dirty="0" smtClean="0"/>
-              <a:t/>
+              <a:t>Summary</a:t>
             </a:r>
             <a:br>
               <a:rPr lang="en-US" sz="4400" dirty="0" smtClean="0"/>
             </a:br>
             <a:r>
+              <a:rPr lang="en-US" sz="4400" dirty="0"/>
+              <a:t/>
+            </a:r>
+            <a:br>
+              <a:rPr lang="en-US" sz="4400" dirty="0"/>
+            </a:br>
+            <a:r>
               <a:rPr lang="en-US" sz="4400" dirty="0" smtClean="0"/>
-              <a:t>Ilya Rokhkin (Git Trainings)</a:t>
+              <a:t>Ilya </a:t>
+            </a:r>
+            <a:r>
+              <a:rPr lang="en-US" sz="4400" dirty="0" smtClean="0"/>
+              <a:t>Rokhkin (Git Trainings</a:t>
+            </a:r>
+            <a:r>
+              <a:rPr lang="en-US" sz="4400" dirty="0" smtClean="0"/>
+              <a:t>)</a:t>
             </a:r>
             <a:br>
               <a:rPr lang="en-US" sz="4400" dirty="0" smtClean="0"/>
             </a:br>
             <a:r>
-              <a:rPr lang="en-US" sz="4400" dirty="0" smtClean="0">
+              <a:rPr lang="en-US" sz="2800" dirty="0">
                 <a:hlinkClick r:id="rId3"/>
               </a:rPr>
-              <a:t>rokhkin_ilya@yahoo.com</a:t>
+              <a:t>https://</a:t>
             </a:r>
             <a:r>
-              <a:rPr lang="en-US" sz="4400" dirty="0" smtClean="0"/>
+              <a:rPr lang="en-US" sz="2800" dirty="0" smtClean="0">
+                <a:hlinkClick r:id="rId3"/>
+              </a:rPr>
+              <a:t>github.com/ilyaro/git_best_practices_ppt</a:t>
+            </a:r>
+            <a:r>
+              <a:rPr lang="en-US" sz="2800" dirty="0" smtClean="0"/>
               <a:t/>
             </a:r>
             <a:br>
-              <a:rPr lang="en-US" sz="4400" dirty="0" smtClean="0"/>
-            </a:br>
-            <a:r>
-              <a:rPr lang="en-US" sz="4400" dirty="0" smtClean="0"/>
-              <a:t>054-5224805</a:t>
-            </a:r>
-            <a:br>
-              <a:rPr lang="en-US" sz="4400" dirty="0" smtClean="0"/>
+              <a:rPr lang="en-US" sz="2800" dirty="0" smtClean="0"/>
             </a:br>
             <a:r>
               <a:rPr lang="en-US" sz="4400" dirty="0" smtClean="0"/>
@@ -8808,9 +8812,32 @@
               <a:rPr lang="en-US" sz="4400" dirty="0" smtClean="0"/>
             </a:br>
             <a:r>
+              <a:rPr lang="en-US" sz="4000" dirty="0" smtClean="0">
+                <a:hlinkClick r:id="rId4"/>
+              </a:rPr>
+              <a:t>rokhkin_ilya@yahoo.com</a:t>
+            </a:r>
+            <a:r>
+              <a:rPr lang="en-US" sz="4000" dirty="0" smtClean="0"/>
+              <a:t/>
+            </a:r>
+            <a:br>
+              <a:rPr lang="en-US" sz="4000" dirty="0" smtClean="0"/>
+            </a:br>
+            <a:r>
+              <a:rPr lang="en-US" sz="4000" dirty="0" smtClean="0"/>
+              <a:t>054-5224805</a:t>
+            </a:r>
+            <a:br>
+              <a:rPr lang="en-US" sz="4000" dirty="0" smtClean="0"/>
+            </a:br>
+            <a:r>
               <a:rPr lang="en-US" sz="4400" dirty="0" smtClean="0"/>
-              <a:t>Thanks!</a:t>
+              <a:t/>
             </a:r>
+            <a:br>
+              <a:rPr lang="en-US" sz="4400" dirty="0" smtClean="0"/>
+            </a:br>
             <a:endParaRPr lang="en-US" sz="4400" dirty="0"/>
           </a:p>
         </p:txBody>
@@ -8980,6 +9007,148 @@
     <p:extLst>
       <p:ext uri="{BB962C8B-B14F-4D97-AF65-F5344CB8AC3E}">
         <p14:creationId xmlns:p14="http://schemas.microsoft.com/office/powerpoint/2010/main" val="1066355941"/>
+      </p:ext>
+    </p:extLst>
+  </p:cSld>
+  <p:clrMapOvr>
+    <a:masterClrMapping/>
+  </p:clrMapOvr>
+</p:sld>
+</file>
+
+<file path=ppt/slides/slide12.xml><?xml version="1.0" encoding="utf-8"?>
+<p:sld xmlns:a="http://schemas.openxmlformats.org/drawingml/2006/main" xmlns:r="http://schemas.openxmlformats.org/officeDocument/2006/relationships" xmlns:p="http://schemas.openxmlformats.org/presentationml/2006/main">
+  <p:cSld>
+    <p:spTree>
+      <p:nvGrpSpPr>
+        <p:cNvPr id="1" name=""/>
+        <p:cNvGrpSpPr/>
+        <p:nvPr/>
+      </p:nvGrpSpPr>
+      <p:grpSpPr>
+        <a:xfrm>
+          <a:off x="0" y="0"/>
+          <a:ext cx="0" cy="0"/>
+          <a:chOff x="0" y="0"/>
+          <a:chExt cx="0" cy="0"/>
+        </a:xfrm>
+      </p:grpSpPr>
+      <p:sp>
+        <p:nvSpPr>
+          <p:cNvPr id="2" name="Title 1"/>
+          <p:cNvSpPr>
+            <a:spLocks noGrp="1"/>
+          </p:cNvSpPr>
+          <p:nvPr>
+            <p:ph type="title"/>
+          </p:nvPr>
+        </p:nvSpPr>
+        <p:spPr/>
+        <p:txBody>
+          <a:bodyPr/>
+          <a:lstStyle/>
+          <a:p>
+            <a:pPr algn="ctr"/>
+            <a:r>
+              <a:rPr lang="en-US" dirty="0" smtClean="0"/>
+              <a:t>Git Best Practices</a:t>
+            </a:r>
+            <a:endParaRPr lang="en-US" dirty="0"/>
+          </a:p>
+        </p:txBody>
+      </p:sp>
+      <p:sp>
+        <p:nvSpPr>
+          <p:cNvPr id="3" name="Text Placeholder 2"/>
+          <p:cNvSpPr>
+            <a:spLocks noGrp="1"/>
+          </p:cNvSpPr>
+          <p:nvPr>
+            <p:ph type="body" idx="1"/>
+          </p:nvPr>
+        </p:nvSpPr>
+        <p:spPr/>
+        <p:txBody>
+          <a:bodyPr/>
+          <a:lstStyle/>
+          <a:p>
+            <a:pPr marL="127000" indent="0" algn="ctr">
+              <a:buNone/>
+            </a:pPr>
+            <a:endParaRPr lang="en-US" sz="4800" dirty="0" smtClean="0"/>
+          </a:p>
+          <a:p>
+            <a:pPr marL="127000" indent="0" algn="ctr">
+              <a:buNone/>
+            </a:pPr>
+            <a:r>
+              <a:rPr lang="en-US" sz="4800" dirty="0" smtClean="0"/>
+              <a:t>Thank You!</a:t>
+            </a:r>
+            <a:endParaRPr lang="en-US" sz="4800" dirty="0"/>
+          </a:p>
+        </p:txBody>
+      </p:sp>
+      <p:sp>
+        <p:nvSpPr>
+          <p:cNvPr id="4" name="Slide Number Placeholder 3"/>
+          <p:cNvSpPr>
+            <a:spLocks noGrp="1"/>
+          </p:cNvSpPr>
+          <p:nvPr>
+            <p:ph type="sldNum" idx="12"/>
+          </p:nvPr>
+        </p:nvSpPr>
+        <p:spPr/>
+        <p:txBody>
+          <a:bodyPr/>
+          <a:lstStyle/>
+          <a:p>
+            <a:pPr marL="0" marR="0" lvl="0" indent="0" algn="r" rtl="0">
+              <a:lnSpc>
+                <a:spcPct val="100000"/>
+              </a:lnSpc>
+              <a:spcBef>
+                <a:spcPts val="0"/>
+              </a:spcBef>
+              <a:spcAft>
+                <a:spcPts val="0"/>
+              </a:spcAft>
+              <a:buClr>
+                <a:schemeClr val="lt2"/>
+              </a:buClr>
+              <a:buSzPct val="25000"/>
+              <a:buFont typeface="Arial"/>
+              <a:buNone/>
+            </a:pPr>
+            <a:fld id="{00000000-1234-1234-1234-123412341234}" type="slidenum">
+              <a:rPr lang="en-US" sz="700" b="0" i="0" u="none" smtClean="0">
+                <a:solidFill>
+                  <a:schemeClr val="lt2"/>
+                </a:solidFill>
+                <a:latin typeface="Arial"/>
+                <a:ea typeface="Arial"/>
+                <a:cs typeface="Arial"/>
+                <a:sym typeface="Arial"/>
+              </a:rPr>
+              <a:t>12</a:t>
+            </a:fld>
+            <a:endParaRPr lang="en-US" sz="700" b="0" i="0" u="none">
+              <a:solidFill>
+                <a:schemeClr val="lt2"/>
+              </a:solidFill>
+              <a:latin typeface="Arial"/>
+              <a:ea typeface="Arial"/>
+              <a:cs typeface="Arial"/>
+              <a:sym typeface="Arial"/>
+            </a:endParaRPr>
+          </a:p>
+        </p:txBody>
+      </p:sp>
+    </p:spTree>
+    <p:extLst>
+      <p:ext uri="{BB962C8B-B14F-4D97-AF65-F5344CB8AC3E}">
+        <p14:creationId xmlns:p14="http://schemas.microsoft.com/office/powerpoint/2010/main" val="21745747"/>
       </p:ext>
     </p:extLst>
   </p:cSld>
@@ -10416,11 +10585,7 @@
           <a:p>
             <a:r>
               <a:rPr lang="en-US" sz="2400" dirty="0" smtClean="0"/>
-              <a:t>Demo: git </a:t>
-            </a:r>
-            <a:r>
-              <a:rPr lang="en-US" sz="2400" dirty="0" smtClean="0"/>
-              <a:t>merge --squash</a:t>
+              <a:t>Demo: git merge --squash</a:t>
             </a:r>
             <a:endParaRPr lang="en-US" sz="2400" dirty="0"/>
           </a:p>
@@ -10899,41 +11064,13 @@
           <a:p>
             <a:r>
               <a:rPr lang="en-US" sz="2400" dirty="0" smtClean="0"/>
-              <a:t>Limit commit message </a:t>
+              <a:t>Limit commit message Subject to 70 chars and it must be simple, clear, self explained – this is the line all will see!</a:t>
             </a:r>
+          </a:p>
+          <a:p>
             <a:r>
               <a:rPr lang="en-US" sz="2400" dirty="0" smtClean="0"/>
-              <a:t>Subject </a:t>
-            </a:r>
-            <a:r>
-              <a:rPr lang="en-US" sz="2400" dirty="0" smtClean="0"/>
-              <a:t>to 70 chars and it must be simple, clear, self explained – this is the line all will see!</a:t>
-            </a:r>
-          </a:p>
-          <a:p>
-            <a:r>
-              <a:rPr lang="en-US" sz="2400" dirty="0" smtClean="0"/>
-              <a:t>Meaningful details </a:t>
-            </a:r>
-            <a:r>
-              <a:rPr lang="en-US" sz="2400" dirty="0" smtClean="0"/>
-              <a:t>put in </a:t>
-            </a:r>
-            <a:r>
-              <a:rPr lang="en-US" sz="2400" dirty="0" smtClean="0"/>
-              <a:t>the </a:t>
-            </a:r>
-            <a:r>
-              <a:rPr lang="en-US" sz="2400" dirty="0" smtClean="0"/>
-              <a:t>body of </a:t>
-            </a:r>
-            <a:r>
-              <a:rPr lang="en-US" sz="2400" dirty="0" smtClean="0"/>
-              <a:t>the </a:t>
-            </a:r>
-            <a:r>
-              <a:rPr lang="en-US" sz="2400" dirty="0" smtClean="0"/>
-              <a:t>commit message</a:t>
+              <a:t>Meaningful details put in the body of the commit message</a:t>
             </a:r>
             <a:endParaRPr lang="en-US" sz="2400" dirty="0"/>
           </a:p>

</xml_diff>

<commit_message>
Adding to ppt commands commit anf log
</commit_message>
<xml_diff>
--- a/Git_Best_Practices.pptx
+++ b/Git_Best_Practices.pptx
@@ -25,12 +25,12 @@
   <p:notesSz cx="6934200" cy="9232900"/>
   <p:embeddedFontLst>
     <p:embeddedFont>
-      <p:font typeface="Amatic SC" panose="020B0604020202020204" charset="-79"/>
+      <p:font typeface="Source Code Pro" panose="020B0604020202020204" charset="0"/>
       <p:regular r:id="rId15"/>
       <p:bold r:id="rId16"/>
     </p:embeddedFont>
     <p:embeddedFont>
-      <p:font typeface="Source Code Pro" panose="020B0604020202020204" charset="0"/>
+      <p:font typeface="Amatic SC" panose="020B0604020202020204" charset="-79"/>
       <p:regular r:id="rId17"/>
       <p:bold r:id="rId18"/>
     </p:embeddedFont>
@@ -2914,7 +2914,7 @@
           <a:p>
             <a:fld id="{559FE8C8-AC97-4ADA-A254-8F11A723A69F}" type="datetimeFigureOut">
               <a:rPr lang="en-US" smtClean="0"/>
-              <a:t>6/27/2019</a:t>
+              <a:t>7/14/2019</a:t>
             </a:fld>
             <a:endParaRPr lang="en-US"/>
           </a:p>
@@ -3335,7 +3335,7 @@
           <a:p>
             <a:fld id="{B88F23AA-34D9-4A18-A5A1-06793324E42C}" type="datetimeFigureOut">
               <a:rPr lang="en-US" smtClean="0"/>
-              <a:t>6/27/2019</a:t>
+              <a:t>7/14/2019</a:t>
             </a:fld>
             <a:endParaRPr lang="en-US"/>
           </a:p>
@@ -3457,7 +3457,7 @@
           <a:p>
             <a:fld id="{8DA20C1D-75ED-450C-88C7-C497EA874E9C}" type="datetimeFigureOut">
               <a:rPr lang="en-US" smtClean="0"/>
-              <a:t>6/27/2019</a:t>
+              <a:t>7/14/2019</a:t>
             </a:fld>
             <a:endParaRPr lang="en-US"/>
           </a:p>
@@ -4651,7 +4651,7 @@
           <a:p>
             <a:fld id="{FEFA0557-7C35-4D1D-B97A-95898D157B33}" type="datetimeFigureOut">
               <a:rPr lang="en-US" smtClean="0"/>
-              <a:t>6/27/2019</a:t>
+              <a:t>7/14/2019</a:t>
             </a:fld>
             <a:endParaRPr lang="en-US"/>
           </a:p>
@@ -4937,7 +4937,7 @@
           <a:p>
             <a:fld id="{B236AB90-F632-4852-BC4B-53E103869F3D}" type="datetimeFigureOut">
               <a:rPr lang="en-US" smtClean="0"/>
-              <a:t>6/27/2019</a:t>
+              <a:t>7/14/2019</a:t>
             </a:fld>
             <a:endParaRPr lang="en-US"/>
           </a:p>
@@ -5323,7 +5323,7 @@
           <a:p>
             <a:fld id="{12374C44-A702-4728-BB40-76FE555B9CF1}" type="datetimeFigureOut">
               <a:rPr lang="en-US" smtClean="0"/>
-              <a:t>6/27/2019</a:t>
+              <a:t>7/14/2019</a:t>
             </a:fld>
             <a:endParaRPr lang="en-US"/>
           </a:p>
@@ -5536,7 +5536,7 @@
           <a:p>
             <a:fld id="{E1F32DF0-702E-431A-ADCF-2A06AC4E7F57}" type="datetimeFigureOut">
               <a:rPr lang="en-US" smtClean="0"/>
-              <a:t>6/27/2019</a:t>
+              <a:t>7/14/2019</a:t>
             </a:fld>
             <a:endParaRPr lang="en-US"/>
           </a:p>
@@ -5840,7 +5840,7 @@
           <a:p>
             <a:fld id="{DBDC1F8B-7509-4E85-ABDB-3F1EEA772746}" type="datetimeFigureOut">
               <a:rPr lang="en-US" smtClean="0"/>
-              <a:t>6/27/2019</a:t>
+              <a:t>7/14/2019</a:t>
             </a:fld>
             <a:endParaRPr lang="en-US"/>
           </a:p>
@@ -6132,7 +6132,7 @@
           <a:p>
             <a:fld id="{52C5D9E0-CA9E-46E5-9606-B0D66E683FEE}" type="datetimeFigureOut">
               <a:rPr lang="en-US" smtClean="0"/>
-              <a:t>6/27/2019</a:t>
+              <a:t>7/14/2019</a:t>
             </a:fld>
             <a:endParaRPr lang="en-US"/>
           </a:p>
@@ -6706,7 +6706,7 @@
           <a:p>
             <a:fld id="{5BA37E64-D101-4693-B362-74BB0158B47B}" type="datetimeFigureOut">
               <a:rPr lang="en-US" smtClean="0"/>
-              <a:t>6/27/2019</a:t>
+              <a:t>7/14/2019</a:t>
             </a:fld>
             <a:endParaRPr lang="en-US"/>
           </a:p>
@@ -6882,7 +6882,7 @@
           <a:p>
             <a:fld id="{FACA2033-B529-4F88-BF0F-C9E77C7AF715}" type="datetimeFigureOut">
               <a:rPr lang="en-US" smtClean="0"/>
-              <a:t>6/27/2019</a:t>
+              <a:t>7/14/2019</a:t>
             </a:fld>
             <a:endParaRPr lang="en-US"/>
           </a:p>
@@ -7522,7 +7522,7 @@
           <a:p>
             <a:fld id="{2F850279-8577-4DB5-A1B1-2A1239DFFE30}" type="datetimeFigureOut">
               <a:rPr lang="en-US" smtClean="0"/>
-              <a:t>6/27/2019</a:t>
+              <a:t>7/14/2019</a:t>
             </a:fld>
             <a:endParaRPr lang="en-US"/>
           </a:p>
@@ -8675,6 +8675,13 @@
   <p:clrMapOvr>
     <a:masterClrMapping/>
   </p:clrMapOvr>
+  <p:timing>
+    <p:tnLst>
+      <p:par>
+        <p:cTn id="1" dur="indefinite" restart="never" nodeType="tmRoot"/>
+      </p:par>
+    </p:tnLst>
+  </p:timing>
 </p:sld>
 </file>
 
@@ -8772,15 +8779,7 @@
             </a:br>
             <a:r>
               <a:rPr lang="en-US" sz="4400" dirty="0" smtClean="0"/>
-              <a:t>Ilya </a:t>
-            </a:r>
-            <a:r>
-              <a:rPr lang="en-US" sz="4400" dirty="0" smtClean="0"/>
-              <a:t>Rokhkin (Git Trainings</a:t>
-            </a:r>
-            <a:r>
-              <a:rPr lang="en-US" sz="4400" dirty="0" smtClean="0"/>
-              <a:t>)</a:t>
+              <a:t>Ilya Rokhkin (Git Trainings)</a:t>
             </a:r>
             <a:br>
               <a:rPr lang="en-US" sz="4400" dirty="0" smtClean="0"/>
@@ -9013,6 +9012,13 @@
   <p:clrMapOvr>
     <a:masterClrMapping/>
   </p:clrMapOvr>
+  <p:timing>
+    <p:tnLst>
+      <p:par>
+        <p:cTn id="1" dur="indefinite" restart="never" nodeType="tmRoot"/>
+      </p:par>
+    </p:tnLst>
+  </p:timing>
 </p:sld>
 </file>
 
@@ -9155,6 +9161,13 @@
   <p:clrMapOvr>
     <a:masterClrMapping/>
   </p:clrMapOvr>
+  <p:timing>
+    <p:tnLst>
+      <p:par>
+        <p:cTn id="1" dur="indefinite" restart="never" nodeType="tmRoot"/>
+      </p:par>
+    </p:tnLst>
+  </p:timing>
 </p:sld>
 </file>
 
@@ -10549,7 +10562,7 @@
         </p:blipFill>
         <p:spPr>
           <a:xfrm>
-            <a:off x="0" y="1549400"/>
+            <a:off x="0" y="1600200"/>
             <a:ext cx="9150350" cy="4394200"/>
           </a:xfrm>
           <a:prstGeom prst="rect">
@@ -10569,8 +10582,8 @@
         </p:nvSpPr>
         <p:spPr>
           <a:xfrm>
-            <a:off x="609600" y="6096000"/>
-            <a:ext cx="3744936" cy="461665"/>
+            <a:off x="14785" y="6027003"/>
+            <a:ext cx="9144000" cy="830997"/>
           </a:xfrm>
           <a:prstGeom prst="rect">
             <a:avLst/>
@@ -10578,14 +10591,45 @@
           <a:noFill/>
         </p:spPr>
         <p:txBody>
-          <a:bodyPr wrap="none" rtlCol="0">
+          <a:bodyPr wrap="square" rtlCol="0">
             <a:spAutoFit/>
           </a:bodyPr>
           <a:lstStyle/>
           <a:p>
             <a:r>
               <a:rPr lang="en-US" sz="2400" dirty="0" smtClean="0"/>
-              <a:t>Demo: git merge --squash</a:t>
+              <a:t>Demo: git merge </a:t>
+            </a:r>
+            <a:r>
+              <a:rPr lang="en-US" sz="2400" dirty="0" smtClean="0"/>
+              <a:t>–squash, </a:t>
+            </a:r>
+            <a:r>
+              <a:rPr lang="en-US" sz="2400" dirty="0"/>
+              <a:t>git </a:t>
+            </a:r>
+            <a:r>
+              <a:rPr lang="en-US" sz="2400" dirty="0" smtClean="0"/>
+              <a:t>commit, </a:t>
+            </a:r>
+            <a:br>
+              <a:rPr lang="en-US" sz="2400" dirty="0" smtClean="0"/>
+            </a:br>
+            <a:r>
+              <a:rPr lang="en-US" sz="2400" dirty="0" smtClean="0"/>
+              <a:t>git </a:t>
+            </a:r>
+            <a:r>
+              <a:rPr lang="en-US" sz="2400" dirty="0"/>
+              <a:t>log --</a:t>
+            </a:r>
+            <a:r>
+              <a:rPr lang="en-US" sz="2400" dirty="0" err="1"/>
+              <a:t>oneline</a:t>
+            </a:r>
+            <a:r>
+              <a:rPr lang="en-US" sz="2400" dirty="0"/>
+              <a:t> --graph --all</a:t>
             </a:r>
             <a:endParaRPr lang="en-US" sz="2400" dirty="0"/>
           </a:p>

</xml_diff>

<commit_message>
Adding git tag to correct place
Fixing ppt with commit
</commit_message>
<xml_diff>
--- a/Git_Best_Practices.pptx
+++ b/Git_Best_Practices.pptx
@@ -25,21 +25,21 @@
   <p:notesSz cx="6934200" cy="9232900"/>
   <p:embeddedFontLst>
     <p:embeddedFont>
-      <p:font typeface="Merriweather" panose="020B0604020202020204" charset="0"/>
+      <p:font typeface="Amatic SC" panose="020B0604020202020204" charset="-79"/>
       <p:regular r:id="rId15"/>
       <p:bold r:id="rId16"/>
-      <p:italic r:id="rId17"/>
-      <p:boldItalic r:id="rId18"/>
     </p:embeddedFont>
     <p:embeddedFont>
       <p:font typeface="Source Code Pro" panose="020B0604020202020204" charset="0"/>
+      <p:regular r:id="rId17"/>
+      <p:bold r:id="rId18"/>
+    </p:embeddedFont>
+    <p:embeddedFont>
+      <p:font typeface="Merriweather" panose="020B0604020202020204" charset="0"/>
       <p:regular r:id="rId19"/>
       <p:bold r:id="rId20"/>
-    </p:embeddedFont>
-    <p:embeddedFont>
-      <p:font typeface="Amatic SC" panose="020B0604020202020204" charset="-79"/>
-      <p:regular r:id="rId21"/>
-      <p:bold r:id="rId22"/>
+      <p:italic r:id="rId21"/>
+      <p:boldItalic r:id="rId22"/>
     </p:embeddedFont>
   </p:embeddedFontLst>
   <p:defaultTextStyle>
@@ -9757,7 +9757,7 @@
         <p:spPr>
           <a:xfrm>
             <a:off x="457200" y="6172200"/>
-            <a:ext cx="4003019" cy="307777"/>
+            <a:ext cx="3425938" cy="307777"/>
           </a:xfrm>
           <a:prstGeom prst="rect">
             <a:avLst/>
@@ -9772,7 +9772,11 @@
           <a:p>
             <a:r>
               <a:rPr lang="en-US" dirty="0" smtClean="0"/>
-              <a:t>Demo: create feature branch, checkout, commit </a:t>
+              <a:t>Demo: create feature branch, </a:t>
+            </a:r>
+            <a:r>
+              <a:rPr lang="en-US" dirty="0" smtClean="0"/>
+              <a:t>checkout </a:t>
             </a:r>
             <a:endParaRPr lang="en-US" dirty="0"/>
           </a:p>
@@ -10130,19 +10134,7 @@
           <a:p>
             <a:r>
               <a:rPr lang="en-US" sz="2400" dirty="0" smtClean="0"/>
-              <a:t>Demo: vim, change, </a:t>
-            </a:r>
-            <a:r>
-              <a:rPr lang="en-US" sz="2400" dirty="0" smtClean="0"/>
-              <a:t>save -&gt; </a:t>
-            </a:r>
-            <a:r>
-              <a:rPr lang="en-US" sz="2400" dirty="0" smtClean="0"/>
-              <a:t>auto-commit</a:t>
-            </a:r>
-            <a:r>
-              <a:rPr lang="en-US" sz="2400" dirty="0" smtClean="0"/>
-              <a:t>, git log –c, git reset </a:t>
+              <a:t>Demo: vim, change, save -&gt; auto-commit, git log –c, git reset </a:t>
             </a:r>
             <a:endParaRPr lang="en-US" sz="2400" dirty="0"/>
           </a:p>
@@ -10860,15 +10852,15 @@
             </a:r>
             <a:r>
               <a:rPr lang="en-US" sz="2400" dirty="0"/>
-              <a:t>log --</a:t>
+              <a:t>log </a:t>
             </a:r>
             <a:r>
-              <a:rPr lang="en-US" sz="2400" dirty="0" err="1"/>
-              <a:t>oneline</a:t>
+              <a:rPr lang="en-US" sz="2400" dirty="0" smtClean="0"/>
+              <a:t>--online </a:t>
             </a:r>
             <a:r>
               <a:rPr lang="en-US" sz="2400" dirty="0"/>
-              <a:t> --graph </a:t>
+              <a:t>--graph </a:t>
             </a:r>
             <a:r>
               <a:rPr lang="en-US" sz="2400" dirty="0" smtClean="0"/>

</xml_diff>

<commit_message>
Correcting to --, moving tag slide forward
</commit_message>
<xml_diff>
--- a/Git_Best_Practices.pptx
+++ b/Git_Best_Practices.pptx
@@ -30,16 +30,16 @@
       <p:bold r:id="rId16"/>
     </p:embeddedFont>
     <p:embeddedFont>
-      <p:font typeface="Source Code Pro" panose="020B0604020202020204" charset="0"/>
+      <p:font typeface="Merriweather" panose="020B0604020202020204" charset="0"/>
       <p:regular r:id="rId17"/>
       <p:bold r:id="rId18"/>
+      <p:italic r:id="rId19"/>
+      <p:boldItalic r:id="rId20"/>
     </p:embeddedFont>
     <p:embeddedFont>
-      <p:font typeface="Merriweather" panose="020B0604020202020204" charset="0"/>
-      <p:regular r:id="rId19"/>
-      <p:bold r:id="rId20"/>
-      <p:italic r:id="rId21"/>
-      <p:boldItalic r:id="rId22"/>
+      <p:font typeface="Source Code Pro" panose="020B0604020202020204" charset="0"/>
+      <p:regular r:id="rId21"/>
+      <p:bold r:id="rId22"/>
     </p:embeddedFont>
   </p:embeddedFontLst>
   <p:defaultTextStyle>
@@ -8996,6 +8996,44 @@
           </a:p>
         </p:txBody>
       </p:sp>
+      <p:sp>
+        <p:nvSpPr>
+          <p:cNvPr id="5" name="Footer Placeholder 4" hidden="1"/>
+          <p:cNvSpPr>
+            <a:spLocks noGrp="1"/>
+          </p:cNvSpPr>
+          <p:nvPr>
+            <p:ph type="ftr" idx="11"/>
+          </p:nvPr>
+        </p:nvSpPr>
+        <p:spPr/>
+        <p:txBody>
+          <a:bodyPr/>
+          <a:lstStyle/>
+          <a:p>
+            <a:endParaRPr lang="en-US"/>
+          </a:p>
+        </p:txBody>
+      </p:sp>
+      <p:sp>
+        <p:nvSpPr>
+          <p:cNvPr id="6" name="Date Placeholder 5" hidden="1"/>
+          <p:cNvSpPr>
+            <a:spLocks noGrp="1"/>
+          </p:cNvSpPr>
+          <p:nvPr>
+            <p:ph type="dt" idx="10"/>
+          </p:nvPr>
+        </p:nvSpPr>
+        <p:spPr/>
+        <p:txBody>
+          <a:bodyPr/>
+          <a:lstStyle/>
+          <a:p>
+            <a:endParaRPr lang="en-US"/>
+          </a:p>
+        </p:txBody>
+      </p:sp>
     </p:spTree>
     <p:extLst>
       <p:ext uri="{BB962C8B-B14F-4D97-AF65-F5344CB8AC3E}">
@@ -9772,11 +9810,7 @@
           <a:p>
             <a:r>
               <a:rPr lang="en-US" dirty="0" smtClean="0"/>
-              <a:t>Demo: create feature branch, </a:t>
-            </a:r>
-            <a:r>
-              <a:rPr lang="en-US" dirty="0" smtClean="0"/>
-              <a:t>checkout </a:t>
+              <a:t>Demo: create feature branch, checkout </a:t>
             </a:r>
             <a:endParaRPr lang="en-US" dirty="0"/>
           </a:p>
@@ -10833,7 +10867,15 @@
           <a:p>
             <a:r>
               <a:rPr lang="en-US" sz="2400" dirty="0" smtClean="0"/>
-              <a:t>Demo: git merge –squash, </a:t>
+              <a:t>Demo: git merge </a:t>
+            </a:r>
+            <a:r>
+              <a:rPr lang="en-US" sz="2400" dirty="0" smtClean="0"/>
+              <a:t>--squash</a:t>
+            </a:r>
+            <a:r>
+              <a:rPr lang="en-US" sz="2400" dirty="0" smtClean="0"/>
+              <a:t>, </a:t>
             </a:r>
             <a:r>
               <a:rPr lang="en-US" sz="2400" dirty="0"/>
@@ -10864,7 +10906,15 @@
             </a:r>
             <a:r>
               <a:rPr lang="en-US" sz="2400" dirty="0" smtClean="0"/>
-              <a:t>–all, git push</a:t>
+              <a:t>--</a:t>
+            </a:r>
+            <a:r>
+              <a:rPr lang="en-US" sz="2400" dirty="0" smtClean="0"/>
+              <a:t>all</a:t>
+            </a:r>
+            <a:r>
+              <a:rPr lang="en-US" sz="2400" dirty="0" smtClean="0"/>
+              <a:t>, git push</a:t>
             </a:r>
             <a:endParaRPr lang="en-US" sz="2400" dirty="0"/>
           </a:p>

</xml_diff>

<commit_message>
Adding VS code working and IntelliJ
</commit_message>
<xml_diff>
--- a/Git_Best_Practices.pptx
+++ b/Git_Best_Practices.pptx
@@ -2914,7 +2914,7 @@
           <a:p>
             <a:fld id="{559FE8C8-AC97-4ADA-A254-8F11A723A69F}" type="datetimeFigureOut">
               <a:rPr lang="en-US" smtClean="0"/>
-              <a:t>7/15/2019</a:t>
+              <a:t>2/26/2020</a:t>
             </a:fld>
             <a:endParaRPr lang="en-US"/>
           </a:p>
@@ -3335,7 +3335,7 @@
           <a:p>
             <a:fld id="{B88F23AA-34D9-4A18-A5A1-06793324E42C}" type="datetimeFigureOut">
               <a:rPr lang="en-US" smtClean="0"/>
-              <a:t>7/15/2019</a:t>
+              <a:t>2/26/2020</a:t>
             </a:fld>
             <a:endParaRPr lang="en-US"/>
           </a:p>
@@ -3457,7 +3457,7 @@
           <a:p>
             <a:fld id="{8DA20C1D-75ED-450C-88C7-C497EA874E9C}" type="datetimeFigureOut">
               <a:rPr lang="en-US" smtClean="0"/>
-              <a:t>7/15/2019</a:t>
+              <a:t>2/26/2020</a:t>
             </a:fld>
             <a:endParaRPr lang="en-US"/>
           </a:p>
@@ -4651,7 +4651,7 @@
           <a:p>
             <a:fld id="{FEFA0557-7C35-4D1D-B97A-95898D157B33}" type="datetimeFigureOut">
               <a:rPr lang="en-US" smtClean="0"/>
-              <a:t>7/15/2019</a:t>
+              <a:t>2/26/2020</a:t>
             </a:fld>
             <a:endParaRPr lang="en-US"/>
           </a:p>
@@ -4937,7 +4937,7 @@
           <a:p>
             <a:fld id="{B236AB90-F632-4852-BC4B-53E103869F3D}" type="datetimeFigureOut">
               <a:rPr lang="en-US" smtClean="0"/>
-              <a:t>7/15/2019</a:t>
+              <a:t>2/26/2020</a:t>
             </a:fld>
             <a:endParaRPr lang="en-US"/>
           </a:p>
@@ -5323,7 +5323,7 @@
           <a:p>
             <a:fld id="{12374C44-A702-4728-BB40-76FE555B9CF1}" type="datetimeFigureOut">
               <a:rPr lang="en-US" smtClean="0"/>
-              <a:t>7/15/2019</a:t>
+              <a:t>2/26/2020</a:t>
             </a:fld>
             <a:endParaRPr lang="en-US"/>
           </a:p>
@@ -5536,7 +5536,7 @@
           <a:p>
             <a:fld id="{E1F32DF0-702E-431A-ADCF-2A06AC4E7F57}" type="datetimeFigureOut">
               <a:rPr lang="en-US" smtClean="0"/>
-              <a:t>7/15/2019</a:t>
+              <a:t>2/26/2020</a:t>
             </a:fld>
             <a:endParaRPr lang="en-US"/>
           </a:p>
@@ -5840,7 +5840,7 @@
           <a:p>
             <a:fld id="{DBDC1F8B-7509-4E85-ABDB-3F1EEA772746}" type="datetimeFigureOut">
               <a:rPr lang="en-US" smtClean="0"/>
-              <a:t>7/15/2019</a:t>
+              <a:t>2/26/2020</a:t>
             </a:fld>
             <a:endParaRPr lang="en-US"/>
           </a:p>
@@ -6132,7 +6132,7 @@
           <a:p>
             <a:fld id="{52C5D9E0-CA9E-46E5-9606-B0D66E683FEE}" type="datetimeFigureOut">
               <a:rPr lang="en-US" smtClean="0"/>
-              <a:t>7/15/2019</a:t>
+              <a:t>2/26/2020</a:t>
             </a:fld>
             <a:endParaRPr lang="en-US"/>
           </a:p>
@@ -6706,7 +6706,7 @@
           <a:p>
             <a:fld id="{5BA37E64-D101-4693-B362-74BB0158B47B}" type="datetimeFigureOut">
               <a:rPr lang="en-US" smtClean="0"/>
-              <a:t>7/15/2019</a:t>
+              <a:t>2/26/2020</a:t>
             </a:fld>
             <a:endParaRPr lang="en-US"/>
           </a:p>
@@ -6882,7 +6882,7 @@
           <a:p>
             <a:fld id="{FACA2033-B529-4F88-BF0F-C9E77C7AF715}" type="datetimeFigureOut">
               <a:rPr lang="en-US" smtClean="0"/>
-              <a:t>7/15/2019</a:t>
+              <a:t>2/26/2020</a:t>
             </a:fld>
             <a:endParaRPr lang="en-US"/>
           </a:p>
@@ -7522,7 +7522,7 @@
           <a:p>
             <a:fld id="{2F850279-8577-4DB5-A1B1-2A1239DFFE30}" type="datetimeFigureOut">
               <a:rPr lang="en-US" smtClean="0"/>
-              <a:t>7/15/2019</a:t>
+              <a:t>2/26/2020</a:t>
             </a:fld>
             <a:endParaRPr lang="en-US"/>
           </a:p>
@@ -8234,7 +8234,7 @@
               <a:buNone/>
             </a:pPr>
             <a:r>
-              <a:rPr lang="en-US" sz="2000" b="0" i="0" u="none" strike="noStrike" cap="none" dirty="0" smtClean="0">
+              <a:rPr lang="en-US" sz="2000" b="0" i="0" u="none" strike="noStrike" cap="none" smtClean="0">
                 <a:solidFill>
                   <a:srgbClr val="000000"/>
                 </a:solidFill>
@@ -8243,20 +8243,17 @@
                 <a:cs typeface="Merriweather"/>
                 <a:sym typeface="Merriweather"/>
               </a:rPr>
-              <a:t>201</a:t>
+              <a:t>2020</a:t>
             </a:r>
-            <a:r>
-              <a:rPr lang="en-US" sz="2000" b="0" dirty="0">
-                <a:solidFill>
-                  <a:srgbClr val="000000"/>
-                </a:solidFill>
-                <a:latin typeface="Merriweather"/>
-                <a:ea typeface="Merriweather"/>
-                <a:cs typeface="Merriweather"/>
-                <a:sym typeface="Merriweather"/>
-              </a:rPr>
-              <a:t>9</a:t>
-            </a:r>
+            <a:endParaRPr lang="en-US" sz="2000" b="0" dirty="0">
+              <a:solidFill>
+                <a:srgbClr val="000000"/>
+              </a:solidFill>
+              <a:latin typeface="Merriweather"/>
+              <a:ea typeface="Merriweather"/>
+              <a:cs typeface="Merriweather"/>
+              <a:sym typeface="Merriweather"/>
+            </a:endParaRPr>
           </a:p>
         </p:txBody>
       </p:sp>
@@ -8360,13 +8357,13 @@
               <a:buNone/>
             </a:pPr>
             <a:r>
-              <a:rPr lang="en-US"/>
+              <a:rPr lang="en-US" dirty="0"/>
               <a:t>Best practices – Branch Layout</a:t>
             </a:r>
             <a:br>
-              <a:rPr lang="en-US"/>
+              <a:rPr lang="en-US" dirty="0"/>
             </a:br>
-            <a:endParaRPr lang="en-US"/>
+            <a:endParaRPr lang="en-US" dirty="0"/>
           </a:p>
         </p:txBody>
       </p:sp>
@@ -9895,7 +9892,7 @@
               <a:buNone/>
             </a:pPr>
             <a:r>
-              <a:rPr lang="en-US" sz="3400" b="0" i="0" u="none" strike="noStrike" cap="none">
+              <a:rPr lang="en-US" sz="3400" b="0" i="0" u="none" strike="noStrike" cap="none" dirty="0">
                 <a:solidFill>
                   <a:schemeClr val="dk2"/>
                 </a:solidFill>
@@ -9907,7 +9904,7 @@
               <a:t>Best practices – commit</a:t>
             </a:r>
             <a:br>
-              <a:rPr lang="en-US" sz="3400" b="0" i="0" u="none" strike="noStrike" cap="none">
+              <a:rPr lang="en-US" sz="3400" b="0" i="0" u="none" strike="noStrike" cap="none" dirty="0">
                 <a:solidFill>
                   <a:schemeClr val="dk2"/>
                 </a:solidFill>
@@ -9918,7 +9915,7 @@
               </a:rPr>
             </a:br>
             <a:r>
-              <a:rPr lang="en-US" sz="3400" b="0" i="0" u="none" strike="noStrike" cap="none">
+              <a:rPr lang="en-US" sz="3400" b="0" i="0" u="none" strike="noStrike" cap="none" dirty="0">
                 <a:solidFill>
                   <a:schemeClr val="dk2"/>
                 </a:solidFill>
@@ -9930,7 +9927,7 @@
               <a:t/>
             </a:r>
             <a:br>
-              <a:rPr lang="en-US" sz="3400" b="0" i="0" u="none" strike="noStrike" cap="none">
+              <a:rPr lang="en-US" sz="3400" b="0" i="0" u="none" strike="noStrike" cap="none" dirty="0">
                 <a:solidFill>
                   <a:schemeClr val="dk2"/>
                 </a:solidFill>
@@ -9940,7 +9937,7 @@
                 <a:sym typeface="Arial"/>
               </a:rPr>
             </a:br>
-            <a:endParaRPr lang="en-US" sz="3400" b="0" i="0" u="none" strike="noStrike" cap="none">
+            <a:endParaRPr lang="en-US" sz="3400" b="0" i="0" u="none" strike="noStrike" cap="none" dirty="0">
               <a:solidFill>
                 <a:schemeClr val="dk2"/>
               </a:solidFill>
@@ -10218,8 +10215,8 @@
         </p:nvSpPr>
         <p:spPr>
           <a:xfrm>
-            <a:off x="592137" y="533400"/>
-            <a:ext cx="8229600" cy="758825"/>
+            <a:off x="76200" y="533400"/>
+            <a:ext cx="8745537" cy="758825"/>
           </a:xfrm>
           <a:prstGeom prst="rect">
             <a:avLst/>
@@ -10253,7 +10250,7 @@
               <a:buNone/>
             </a:pPr>
             <a:r>
-              <a:rPr lang="en-US" sz="3400" b="0" i="0" u="none" strike="noStrike" cap="none">
+              <a:rPr lang="en-US" sz="3400" b="0" i="0" u="none" strike="noStrike" cap="none" dirty="0">
                 <a:solidFill>
                   <a:schemeClr val="dk2"/>
                 </a:solidFill>
@@ -10262,10 +10259,10 @@
                 <a:cs typeface="Arial"/>
                 <a:sym typeface="Arial"/>
               </a:rPr>
-              <a:t>Best practices – tag milestones</a:t>
+              <a:t>Best practices – tag </a:t>
             </a:r>
-            <a:br>
-              <a:rPr lang="en-US" sz="3400" b="0" i="0" u="none" strike="noStrike" cap="none">
+            <a:r>
+              <a:rPr lang="en-US" sz="3400" b="0" i="0" u="none" strike="noStrike" cap="none" dirty="0" smtClean="0">
                 <a:solidFill>
                   <a:schemeClr val="dk2"/>
                 </a:solidFill>
@@ -10274,9 +10271,10 @@
                 <a:cs typeface="Arial"/>
                 <a:sym typeface="Arial"/>
               </a:rPr>
-            </a:br>
+              <a:t>milestones (even local)</a:t>
+            </a:r>
             <a:r>
-              <a:rPr lang="en-US" sz="3400" b="0" i="0" u="none" strike="noStrike" cap="none">
+              <a:rPr lang="en-US" sz="3400" b="0" i="0" u="none" strike="noStrike" cap="none" dirty="0">
                 <a:solidFill>
                   <a:schemeClr val="dk2"/>
                 </a:solidFill>
@@ -10288,7 +10286,7 @@
               <a:t/>
             </a:r>
             <a:br>
-              <a:rPr lang="en-US" sz="3400" b="0" i="0" u="none" strike="noStrike" cap="none">
+              <a:rPr lang="en-US" sz="3400" b="0" i="0" u="none" strike="noStrike" cap="none" dirty="0">
                 <a:solidFill>
                   <a:schemeClr val="dk2"/>
                 </a:solidFill>
@@ -10298,7 +10296,30 @@
                 <a:sym typeface="Arial"/>
               </a:rPr>
             </a:br>
-            <a:endParaRPr lang="en-US" sz="3400" b="0" i="0" u="none" strike="noStrike" cap="none">
+            <a:r>
+              <a:rPr lang="en-US" sz="3400" b="0" i="0" u="none" strike="noStrike" cap="none" dirty="0">
+                <a:solidFill>
+                  <a:schemeClr val="dk2"/>
+                </a:solidFill>
+                <a:latin typeface="Arial"/>
+                <a:ea typeface="Arial"/>
+                <a:cs typeface="Arial"/>
+                <a:sym typeface="Arial"/>
+              </a:rPr>
+              <a:t/>
+            </a:r>
+            <a:br>
+              <a:rPr lang="en-US" sz="3400" b="0" i="0" u="none" strike="noStrike" cap="none" dirty="0">
+                <a:solidFill>
+                  <a:schemeClr val="dk2"/>
+                </a:solidFill>
+                <a:latin typeface="Arial"/>
+                <a:ea typeface="Arial"/>
+                <a:cs typeface="Arial"/>
+                <a:sym typeface="Arial"/>
+              </a:rPr>
+            </a:br>
+            <a:endParaRPr lang="en-US" sz="3400" b="0" i="0" u="none" strike="noStrike" cap="none" dirty="0">
               <a:solidFill>
                 <a:schemeClr val="dk2"/>
               </a:solidFill>
@@ -10632,7 +10653,7 @@
               <a:buNone/>
             </a:pPr>
             <a:r>
-              <a:rPr lang="en-US" sz="3400" b="0" i="0" u="none" strike="noStrike" cap="none">
+              <a:rPr lang="en-US" sz="3400" b="0" i="0" u="none" strike="noStrike" cap="none" dirty="0">
                 <a:solidFill>
                   <a:schemeClr val="dk2"/>
                 </a:solidFill>
@@ -10641,10 +10662,10 @@
                 <a:cs typeface="Arial"/>
                 <a:sym typeface="Arial"/>
               </a:rPr>
-              <a:t>Best practices – squashing</a:t>
+              <a:t>Best practices – </a:t>
             </a:r>
-            <a:br>
-              <a:rPr lang="en-US" sz="3400" b="0" i="0" u="none" strike="noStrike" cap="none">
+            <a:r>
+              <a:rPr lang="en-US" sz="3400" b="0" i="0" u="none" strike="noStrike" cap="none" dirty="0" smtClean="0">
                 <a:solidFill>
                   <a:schemeClr val="dk2"/>
                 </a:solidFill>
@@ -10653,9 +10674,14 @@
                 <a:cs typeface="Arial"/>
                 <a:sym typeface="Arial"/>
               </a:rPr>
-            </a:br>
+              <a:t>squashing befor</a:t>
+            </a:r>
             <a:r>
-              <a:rPr lang="en-US" sz="3400" b="0" i="0" u="none" strike="noStrike" cap="none">
+              <a:rPr lang="en-US" dirty="0" smtClean="0"/>
+              <a:t>e push</a:t>
+            </a:r>
+            <a:r>
+              <a:rPr lang="en-US" sz="3400" b="0" i="0" u="none" strike="noStrike" cap="none" dirty="0">
                 <a:solidFill>
                   <a:schemeClr val="dk2"/>
                 </a:solidFill>
@@ -10667,7 +10693,7 @@
               <a:t/>
             </a:r>
             <a:br>
-              <a:rPr lang="en-US" sz="3400" b="0" i="0" u="none" strike="noStrike" cap="none">
+              <a:rPr lang="en-US" sz="3400" b="0" i="0" u="none" strike="noStrike" cap="none" dirty="0">
                 <a:solidFill>
                   <a:schemeClr val="dk2"/>
                 </a:solidFill>
@@ -10677,7 +10703,30 @@
                 <a:sym typeface="Arial"/>
               </a:rPr>
             </a:br>
-            <a:endParaRPr lang="en-US" sz="3400" b="0" i="0" u="none" strike="noStrike" cap="none">
+            <a:r>
+              <a:rPr lang="en-US" sz="3400" b="0" i="0" u="none" strike="noStrike" cap="none" dirty="0">
+                <a:solidFill>
+                  <a:schemeClr val="dk2"/>
+                </a:solidFill>
+                <a:latin typeface="Arial"/>
+                <a:ea typeface="Arial"/>
+                <a:cs typeface="Arial"/>
+                <a:sym typeface="Arial"/>
+              </a:rPr>
+              <a:t/>
+            </a:r>
+            <a:br>
+              <a:rPr lang="en-US" sz="3400" b="0" i="0" u="none" strike="noStrike" cap="none" dirty="0">
+                <a:solidFill>
+                  <a:schemeClr val="dk2"/>
+                </a:solidFill>
+                <a:latin typeface="Arial"/>
+                <a:ea typeface="Arial"/>
+                <a:cs typeface="Arial"/>
+                <a:sym typeface="Arial"/>
+              </a:rPr>
+            </a:br>
+            <a:endParaRPr lang="en-US" sz="3400" b="0" i="0" u="none" strike="noStrike" cap="none" dirty="0">
               <a:solidFill>
                 <a:schemeClr val="dk2"/>
               </a:solidFill>
@@ -10867,15 +10916,7 @@
           <a:p>
             <a:r>
               <a:rPr lang="en-US" sz="2400" dirty="0" smtClean="0"/>
-              <a:t>Demo: git merge </a:t>
-            </a:r>
-            <a:r>
-              <a:rPr lang="en-US" sz="2400" dirty="0" smtClean="0"/>
-              <a:t>--squash</a:t>
-            </a:r>
-            <a:r>
-              <a:rPr lang="en-US" sz="2400" dirty="0" smtClean="0"/>
-              <a:t>, </a:t>
+              <a:t>Demo: git merge --squash, </a:t>
             </a:r>
             <a:r>
               <a:rPr lang="en-US" sz="2400" dirty="0"/>
@@ -10898,7 +10939,15 @@
             </a:r>
             <a:r>
               <a:rPr lang="en-US" sz="2400" dirty="0" smtClean="0"/>
-              <a:t>--online </a:t>
+              <a:t>--</a:t>
+            </a:r>
+            <a:r>
+              <a:rPr lang="en-US" sz="2400" smtClean="0"/>
+              <a:t>oneline</a:t>
+            </a:r>
+            <a:r>
+              <a:rPr lang="en-US" sz="2400" dirty="0" smtClean="0"/>
+              <a:t> </a:t>
             </a:r>
             <a:r>
               <a:rPr lang="en-US" sz="2400" dirty="0"/>
@@ -10906,15 +10955,7 @@
             </a:r>
             <a:r>
               <a:rPr lang="en-US" sz="2400" dirty="0" smtClean="0"/>
-              <a:t>--</a:t>
-            </a:r>
-            <a:r>
-              <a:rPr lang="en-US" sz="2400" dirty="0" smtClean="0"/>
-              <a:t>all</a:t>
-            </a:r>
-            <a:r>
-              <a:rPr lang="en-US" sz="2400" dirty="0" smtClean="0"/>
-              <a:t>, git push</a:t>
+              <a:t>--all, git push</a:t>
             </a:r>
             <a:endParaRPr lang="en-US" sz="2400" dirty="0"/>
           </a:p>
@@ -11037,7 +11078,7 @@
               <a:buNone/>
             </a:pPr>
             <a:r>
-              <a:rPr lang="en-US" sz="3400" b="0" i="0" u="none" strike="noStrike" cap="none">
+              <a:rPr lang="en-US" sz="3400" b="0" i="0" u="none" strike="noStrike" cap="none" dirty="0">
                 <a:solidFill>
                   <a:schemeClr val="dk2"/>
                 </a:solidFill>
@@ -11049,7 +11090,7 @@
               <a:t>Best practices – clean up local branches</a:t>
             </a:r>
             <a:r>
-              <a:rPr lang="en-US" sz="2400" b="0" i="0" u="none" strike="noStrike" cap="none">
+              <a:rPr lang="en-US" sz="2400" b="0" i="0" u="none" strike="noStrike" cap="none" dirty="0">
                 <a:solidFill>
                   <a:schemeClr val="dk2"/>
                 </a:solidFill>
@@ -11061,7 +11102,7 @@
               <a:t/>
             </a:r>
             <a:br>
-              <a:rPr lang="en-US" sz="2400" b="0" i="0" u="none" strike="noStrike" cap="none">
+              <a:rPr lang="en-US" sz="2400" b="0" i="0" u="none" strike="noStrike" cap="none" dirty="0">
                 <a:solidFill>
                   <a:schemeClr val="dk2"/>
                 </a:solidFill>
@@ -11071,7 +11112,7 @@
                 <a:sym typeface="Arial"/>
               </a:rPr>
             </a:br>
-            <a:endParaRPr lang="en-US" sz="2400" b="0" i="0" u="none" strike="noStrike" cap="none">
+            <a:endParaRPr lang="en-US" sz="2400" b="0" i="0" u="none" strike="noStrike" cap="none" dirty="0">
               <a:solidFill>
                 <a:schemeClr val="dk2"/>
               </a:solidFill>
@@ -11336,7 +11377,7 @@
               <a:buNone/>
             </a:pPr>
             <a:r>
-              <a:rPr lang="en-US"/>
+              <a:rPr lang="en-US" dirty="0"/>
               <a:t>Best practices - concise commit messages</a:t>
             </a:r>
           </a:p>

</xml_diff>